<commit_message>
data exploration slides updates
</commit_message>
<xml_diff>
--- a/03 - Data Exploration, Analytical Formulation, and Baselines/data-exploration.pptx
+++ b/03 - Data Exploration, Analytical Formulation, and Baselines/data-exploration.pptx
@@ -5,21 +5,23 @@
     <p:sldMasterId id="2147483648" r:id="rId1"/>
   </p:sldMasterIdLst>
   <p:notesMasterIdLst>
-    <p:notesMasterId r:id="rId14"/>
+    <p:notesMasterId r:id="rId16"/>
   </p:notesMasterIdLst>
   <p:sldIdLst>
     <p:sldId id="256" r:id="rId2"/>
     <p:sldId id="297" r:id="rId3"/>
     <p:sldId id="281" r:id="rId4"/>
-    <p:sldId id="295" r:id="rId5"/>
-    <p:sldId id="282" r:id="rId6"/>
-    <p:sldId id="285" r:id="rId7"/>
-    <p:sldId id="283" r:id="rId8"/>
-    <p:sldId id="298" r:id="rId9"/>
-    <p:sldId id="260" r:id="rId10"/>
-    <p:sldId id="261" r:id="rId11"/>
-    <p:sldId id="300" r:id="rId12"/>
-    <p:sldId id="299" r:id="rId13"/>
+    <p:sldId id="302" r:id="rId5"/>
+    <p:sldId id="295" r:id="rId6"/>
+    <p:sldId id="282" r:id="rId7"/>
+    <p:sldId id="285" r:id="rId8"/>
+    <p:sldId id="283" r:id="rId9"/>
+    <p:sldId id="298" r:id="rId10"/>
+    <p:sldId id="260" r:id="rId11"/>
+    <p:sldId id="261" r:id="rId12"/>
+    <p:sldId id="300" r:id="rId13"/>
+    <p:sldId id="299" r:id="rId14"/>
+    <p:sldId id="301" r:id="rId15"/>
   </p:sldIdLst>
   <p:sldSz cx="12192000" cy="6858000"/>
   <p:notesSz cx="6858000" cy="9144000"/>
@@ -257,7 +259,7 @@
       <p15:sldGuideLst xmlns:p15="http://schemas.microsoft.com/office/powerpoint/2012/main"/>
     </p:ext>
     <p:ext uri="http://customooxmlschemas.google.com/">
-      <go:slidesCustomData xmlns:go="http://customooxmlschemas.google.com/" xmlns:p15="http://schemas.microsoft.com/office/powerpoint/2012/main" xmlns:p14="http://schemas.microsoft.com/office/powerpoint/2010/main" xmlns:com="http://schemas.openxmlformats.org/drawingml/2006/compatibility" xmlns:pvml="urn:schemas-microsoft-com:office:powerpoint" xmlns:v="urn:schemas-microsoft-com:vml" xmlns:o="urn:schemas-microsoft-com:office:office" xmlns:dgm="http://schemas.openxmlformats.org/drawingml/2006/diagram" xmlns:c="http://schemas.openxmlformats.org/drawingml/2006/chart" xmlns:mv="urn:schemas-microsoft-com:mac:vml" xmlns:mc="http://schemas.openxmlformats.org/markup-compatibility/2006" xmlns="" r:id="rId30" roundtripDataSignature="AMtx7mjFyVUGRZWio+dc9dxzYsimUxNJbg=="/>
+      <go:slidesCustomData xmlns="" xmlns:mc="http://schemas.openxmlformats.org/markup-compatibility/2006" xmlns:mv="urn:schemas-microsoft-com:mac:vml" xmlns:c="http://schemas.openxmlformats.org/drawingml/2006/chart" xmlns:dgm="http://schemas.openxmlformats.org/drawingml/2006/diagram" xmlns:o="urn:schemas-microsoft-com:office:office" xmlns:v="urn:schemas-microsoft-com:vml" xmlns:pvml="urn:schemas-microsoft-com:office:powerpoint" xmlns:com="http://schemas.openxmlformats.org/drawingml/2006/compatibility" xmlns:p14="http://schemas.microsoft.com/office/powerpoint/2010/main" xmlns:p15="http://schemas.microsoft.com/office/powerpoint/2012/main" xmlns:go="http://customooxmlschemas.google.com/" r:id="rId30" roundtripDataSignature="AMtx7mjFyVUGRZWio+dc9dxzYsimUxNJbg=="/>
     </p:ext>
   </p:extLst>
 </p:presentation>
@@ -12093,6 +12095,121 @@
       </p:grpSpPr>
       <p:sp>
         <p:nvSpPr>
+          <p:cNvPr id="7170" name="Rectangle 2"/>
+          <p:cNvSpPr>
+            <a:spLocks noGrp="1" noChangeArrowheads="1"/>
+          </p:cNvSpPr>
+          <p:nvPr>
+            <p:ph type="title"/>
+          </p:nvPr>
+        </p:nvSpPr>
+        <p:spPr/>
+        <p:txBody>
+          <a:bodyPr/>
+          <a:lstStyle/>
+          <a:p>
+            <a:r>
+              <a:rPr lang="en-US" altLang="en-US" dirty="0"/>
+              <a:t> Tools</a:t>
+            </a:r>
+          </a:p>
+        </p:txBody>
+      </p:sp>
+      <p:sp>
+        <p:nvSpPr>
+          <p:cNvPr id="7171" name="Rectangle 3"/>
+          <p:cNvSpPr>
+            <a:spLocks noGrp="1" noChangeArrowheads="1"/>
+          </p:cNvSpPr>
+          <p:nvPr>
+            <p:ph type="body" idx="1"/>
+          </p:nvPr>
+        </p:nvSpPr>
+        <p:spPr/>
+        <p:txBody>
+          <a:bodyPr>
+            <a:normAutofit/>
+          </a:bodyPr>
+          <a:lstStyle/>
+          <a:p>
+            <a:r>
+              <a:rPr lang="en-US" dirty="0"/>
+              <a:t>SQL (directly and through python – psycopg2)</a:t>
+            </a:r>
+            <a:br>
+              <a:rPr lang="en-US" dirty="0"/>
+            </a:br>
+            <a:endParaRPr lang="en-US" dirty="0"/>
+          </a:p>
+          <a:p>
+            <a:r>
+              <a:rPr lang="en-US" dirty="0"/>
+              <a:t>Python (matplotlib, seaborn, </a:t>
+            </a:r>
+            <a:r>
+              <a:rPr lang="en-US" dirty="0" err="1"/>
+              <a:t>altair</a:t>
+            </a:r>
+            <a:r>
+              <a:rPr lang="en-US" dirty="0"/>
+              <a:t>,...)</a:t>
+            </a:r>
+            <a:br>
+              <a:rPr lang="en-US" dirty="0"/>
+            </a:br>
+            <a:endParaRPr lang="en-US" dirty="0"/>
+          </a:p>
+          <a:p>
+            <a:r>
+              <a:rPr lang="en-US" dirty="0"/>
+              <a:t>Pandas(if you have to)</a:t>
+            </a:r>
+            <a:br>
+              <a:rPr lang="en-US" dirty="0"/>
+            </a:br>
+            <a:endParaRPr lang="en-US" dirty="0"/>
+          </a:p>
+          <a:p>
+            <a:r>
+              <a:rPr lang="en-US" dirty="0"/>
+              <a:t>Tableau </a:t>
+            </a:r>
+            <a:endParaRPr lang="en-US" sz="2800" dirty="0"/>
+          </a:p>
+        </p:txBody>
+      </p:sp>
+    </p:spTree>
+    <p:extLst>
+      <p:ext uri="{BB962C8B-B14F-4D97-AF65-F5344CB8AC3E}">
+        <p14:creationId xmlns:p14="http://schemas.microsoft.com/office/powerpoint/2010/main" val="3416135692"/>
+      </p:ext>
+    </p:extLst>
+  </p:cSld>
+  <p:clrMapOvr>
+    <a:masterClrMapping/>
+  </p:clrMapOvr>
+</p:sld>
+</file>
+
+<file path=ppt/slides/slide11.xml><?xml version="1.0" encoding="utf-8"?>
+<p:sld xmlns:a="http://schemas.openxmlformats.org/drawingml/2006/main" xmlns:r="http://schemas.openxmlformats.org/officeDocument/2006/relationships" xmlns:p="http://schemas.openxmlformats.org/presentationml/2006/main">
+  <p:cSld>
+    <p:spTree>
+      <p:nvGrpSpPr>
+        <p:cNvPr id="1" name=""/>
+        <p:cNvGrpSpPr/>
+        <p:nvPr/>
+      </p:nvGrpSpPr>
+      <p:grpSpPr>
+        <a:xfrm>
+          <a:off x="0" y="0"/>
+          <a:ext cx="0" cy="0"/>
+          <a:chOff x="0" y="0"/>
+          <a:chExt cx="0" cy="0"/>
+        </a:xfrm>
+      </p:grpSpPr>
+      <p:sp>
+        <p:nvSpPr>
           <p:cNvPr id="8194" name="Rectangle 2"/>
           <p:cNvSpPr>
             <a:spLocks noGrp="1" noChangeArrowheads="1"/>
@@ -12169,7 +12286,7 @@
 </p:sld>
 </file>
 
-<file path=ppt/slides/slide11.xml><?xml version="1.0" encoding="utf-8"?>
+<file path=ppt/slides/slide12.xml><?xml version="1.0" encoding="utf-8"?>
 <p:sld xmlns:a="http://schemas.openxmlformats.org/drawingml/2006/main" xmlns:r="http://schemas.openxmlformats.org/officeDocument/2006/relationships" xmlns:p="http://schemas.openxmlformats.org/presentationml/2006/main">
   <p:cSld>
     <p:spTree>
@@ -12300,7 +12417,7 @@
 </p:sld>
 </file>
 
-<file path=ppt/slides/slide12.xml><?xml version="1.0" encoding="utf-8"?>
+<file path=ppt/slides/slide13.xml><?xml version="1.0" encoding="utf-8"?>
 <p:sld xmlns:a="http://schemas.openxmlformats.org/drawingml/2006/main" xmlns:r="http://schemas.openxmlformats.org/officeDocument/2006/relationships" xmlns:p="http://schemas.openxmlformats.org/presentationml/2006/main">
   <p:cSld>
     <p:spTree>
@@ -12378,6 +12495,27 @@
           <a:p>
             <a:r>
               <a:rPr lang="en-US" dirty="0"/>
+              <a:t>Wednesday session tomorrow: time for group work</a:t>
+            </a:r>
+          </a:p>
+          <a:p>
+            <a:pPr lvl="1">
+              <a:spcBef>
+                <a:spcPts val="500"/>
+              </a:spcBef>
+            </a:pPr>
+            <a:r>
+              <a:rPr lang="en-US" dirty="0"/>
+              <a:t>Be sure to attend your assigned session from this point forward</a:t>
+            </a:r>
+            <a:br>
+              <a:rPr lang="en-US" dirty="0"/>
+            </a:br>
+            <a:endParaRPr lang="en-US" dirty="0"/>
+          </a:p>
+          <a:p>
+            <a:r>
+              <a:rPr lang="en-US" dirty="0"/>
               <a:t>Due this week:</a:t>
             </a:r>
           </a:p>
@@ -12441,6 +12579,72 @@
     <p:extLst>
       <p:ext uri="{BB962C8B-B14F-4D97-AF65-F5344CB8AC3E}">
         <p14:creationId xmlns:p14="http://schemas.microsoft.com/office/powerpoint/2010/main" val="3754986698"/>
+      </p:ext>
+    </p:extLst>
+  </p:cSld>
+  <p:clrMapOvr>
+    <a:masterClrMapping/>
+  </p:clrMapOvr>
+</p:sld>
+</file>
+
+<file path=ppt/slides/slide14.xml><?xml version="1.0" encoding="utf-8"?>
+<p:sld xmlns:a="http://schemas.openxmlformats.org/drawingml/2006/main" xmlns:r="http://schemas.openxmlformats.org/officeDocument/2006/relationships" xmlns:p="http://schemas.openxmlformats.org/presentationml/2006/main">
+  <p:cSld>
+    <p:spTree>
+      <p:nvGrpSpPr>
+        <p:cNvPr id="1" name=""/>
+        <p:cNvGrpSpPr/>
+        <p:nvPr/>
+      </p:nvGrpSpPr>
+      <p:grpSpPr>
+        <a:xfrm>
+          <a:off x="0" y="0"/>
+          <a:ext cx="0" cy="0"/>
+          <a:chOff x="0" y="0"/>
+          <a:chExt cx="0" cy="0"/>
+        </a:xfrm>
+      </p:grpSpPr>
+      <p:sp>
+        <p:nvSpPr>
+          <p:cNvPr id="4" name="Text Placeholder 3">
+            <a:extLst>
+              <a:ext uri="{FF2B5EF4-FFF2-40B4-BE49-F238E27FC236}">
+                <a16:creationId xmlns:a16="http://schemas.microsoft.com/office/drawing/2014/main" id="{5E600BA7-FA45-884F-9820-9E5F2CB7AA48}"/>
+              </a:ext>
+            </a:extLst>
+          </p:cNvPr>
+          <p:cNvSpPr>
+            <a:spLocks noGrp="1"/>
+          </p:cNvSpPr>
+          <p:nvPr>
+            <p:ph type="body" idx="1"/>
+          </p:nvPr>
+        </p:nvSpPr>
+        <p:spPr>
+          <a:xfrm>
+            <a:off x="415650" y="2724664"/>
+            <a:ext cx="11360700" cy="1408672"/>
+          </a:xfrm>
+        </p:spPr>
+        <p:txBody>
+          <a:bodyPr/>
+          <a:lstStyle/>
+          <a:p>
+            <a:pPr marL="76200" indent="0" algn="ctr">
+              <a:buNone/>
+            </a:pPr>
+            <a:r>
+              <a:rPr lang="en-US" sz="4800" dirty="0"/>
+              <a:t>Project Team Meeting / Coordination</a:t>
+            </a:r>
+          </a:p>
+        </p:txBody>
+      </p:sp>
+    </p:spTree>
+    <p:extLst>
+      <p:ext uri="{BB962C8B-B14F-4D97-AF65-F5344CB8AC3E}">
+        <p14:creationId xmlns:p14="http://schemas.microsoft.com/office/powerpoint/2010/main" val="3756057737"/>
       </p:ext>
     </p:extLst>
   </p:cSld>
@@ -12517,6 +12721,109 @@
 </file>
 
 <file path=ppt/slides/slide3.xml><?xml version="1.0" encoding="utf-8"?>
+<p:sld xmlns:a="http://schemas.openxmlformats.org/drawingml/2006/main" xmlns:r="http://schemas.openxmlformats.org/officeDocument/2006/relationships" xmlns:p="http://schemas.openxmlformats.org/presentationml/2006/main">
+  <p:cSld>
+    <p:spTree>
+      <p:nvGrpSpPr>
+        <p:cNvPr id="1" name=""/>
+        <p:cNvGrpSpPr/>
+        <p:nvPr/>
+      </p:nvGrpSpPr>
+      <p:grpSpPr>
+        <a:xfrm>
+          <a:off x="0" y="0"/>
+          <a:ext cx="0" cy="0"/>
+          <a:chOff x="0" y="0"/>
+          <a:chExt cx="0" cy="0"/>
+        </a:xfrm>
+      </p:grpSpPr>
+      <p:sp>
+        <p:nvSpPr>
+          <p:cNvPr id="3" name="Title 2">
+            <a:extLst>
+              <a:ext uri="{FF2B5EF4-FFF2-40B4-BE49-F238E27FC236}">
+                <a16:creationId xmlns:a16="http://schemas.microsoft.com/office/drawing/2014/main" id="{9323871C-7CA8-1448-8FFC-1AE6E1838941}"/>
+              </a:ext>
+            </a:extLst>
+          </p:cNvPr>
+          <p:cNvSpPr>
+            <a:spLocks noGrp="1"/>
+          </p:cNvSpPr>
+          <p:nvPr>
+            <p:ph type="title"/>
+          </p:nvPr>
+        </p:nvSpPr>
+        <p:spPr/>
+        <p:txBody>
+          <a:bodyPr/>
+          <a:lstStyle/>
+          <a:p>
+            <a:r>
+              <a:rPr lang="en-US" dirty="0"/>
+              <a:t>Plan for today</a:t>
+            </a:r>
+          </a:p>
+        </p:txBody>
+      </p:sp>
+      <p:sp>
+        <p:nvSpPr>
+          <p:cNvPr id="4" name="Text Placeholder 3">
+            <a:extLst>
+              <a:ext uri="{FF2B5EF4-FFF2-40B4-BE49-F238E27FC236}">
+                <a16:creationId xmlns:a16="http://schemas.microsoft.com/office/drawing/2014/main" id="{5E600BA7-FA45-884F-9820-9E5F2CB7AA48}"/>
+              </a:ext>
+            </a:extLst>
+          </p:cNvPr>
+          <p:cNvSpPr>
+            <a:spLocks noGrp="1"/>
+          </p:cNvSpPr>
+          <p:nvPr>
+            <p:ph type="body" idx="1"/>
+          </p:nvPr>
+        </p:nvSpPr>
+        <p:spPr/>
+        <p:txBody>
+          <a:bodyPr/>
+          <a:lstStyle/>
+          <a:p>
+            <a:r>
+              <a:rPr lang="en-US" dirty="0"/>
+              <a:t>Data exploration overview and pointers</a:t>
+            </a:r>
+            <a:br>
+              <a:rPr lang="en-US" b="1" dirty="0"/>
+            </a:br>
+            <a:endParaRPr lang="en-US" b="1" dirty="0"/>
+          </a:p>
+          <a:p>
+            <a:r>
+              <a:rPr lang="en-US" dirty="0"/>
+              <a:t>Time to meet and coordinate with your groups </a:t>
+            </a:r>
+            <a:br>
+              <a:rPr lang="en-US" dirty="0"/>
+            </a:br>
+            <a:r>
+              <a:rPr lang="en-US" dirty="0"/>
+              <a:t>(~30 minutes at the end of class)</a:t>
+            </a:r>
+          </a:p>
+        </p:txBody>
+      </p:sp>
+    </p:spTree>
+    <p:extLst>
+      <p:ext uri="{BB962C8B-B14F-4D97-AF65-F5344CB8AC3E}">
+        <p14:creationId xmlns:p14="http://schemas.microsoft.com/office/powerpoint/2010/main" val="1285932549"/>
+      </p:ext>
+    </p:extLst>
+  </p:cSld>
+  <p:clrMapOvr>
+    <a:masterClrMapping/>
+  </p:clrMapOvr>
+</p:sld>
+</file>
+
+<file path=ppt/slides/slide4.xml><?xml version="1.0" encoding="utf-8"?>
 <p:sld xmlns:a="http://schemas.openxmlformats.org/drawingml/2006/main" xmlns:r="http://schemas.openxmlformats.org/officeDocument/2006/relationships" xmlns:p="http://schemas.openxmlformats.org/presentationml/2006/main">
   <p:cSld>
     <p:spTree>
@@ -12594,6 +12901,27 @@
           <a:p>
             <a:r>
               <a:rPr lang="en-US" dirty="0"/>
+              <a:t>Wednesday session tomorrow: time for group work</a:t>
+            </a:r>
+          </a:p>
+          <a:p>
+            <a:pPr lvl="1">
+              <a:spcBef>
+                <a:spcPts val="500"/>
+              </a:spcBef>
+            </a:pPr>
+            <a:r>
+              <a:rPr lang="en-US" dirty="0"/>
+              <a:t>Be sure to attend your assigned session from this point forward</a:t>
+            </a:r>
+            <a:br>
+              <a:rPr lang="en-US" dirty="0"/>
+            </a:br>
+            <a:endParaRPr lang="en-US" dirty="0"/>
+          </a:p>
+          <a:p>
+            <a:r>
+              <a:rPr lang="en-US" dirty="0"/>
               <a:t>Due this week:</a:t>
             </a:r>
           </a:p>
@@ -12656,7 +12984,7 @@
     </p:spTree>
     <p:extLst>
       <p:ext uri="{BB962C8B-B14F-4D97-AF65-F5344CB8AC3E}">
-        <p14:creationId xmlns:p14="http://schemas.microsoft.com/office/powerpoint/2010/main" val="1285932549"/>
+        <p14:creationId xmlns:p14="http://schemas.microsoft.com/office/powerpoint/2010/main" val="1926041242"/>
       </p:ext>
     </p:extLst>
   </p:cSld>
@@ -12666,7 +12994,7 @@
 </p:sld>
 </file>
 
-<file path=ppt/slides/slide4.xml><?xml version="1.0" encoding="utf-8"?>
+<file path=ppt/slides/slide5.xml><?xml version="1.0" encoding="utf-8"?>
 <p:sld xmlns:a="http://schemas.openxmlformats.org/drawingml/2006/main" xmlns:r="http://schemas.openxmlformats.org/officeDocument/2006/relationships" xmlns:p="http://schemas.openxmlformats.org/presentationml/2006/main">
   <p:cSld>
     <p:spTree>
@@ -12801,7 +13129,7 @@
 </p:sld>
 </file>
 
-<file path=ppt/slides/slide5.xml><?xml version="1.0" encoding="utf-8"?>
+<file path=ppt/slides/slide6.xml><?xml version="1.0" encoding="utf-8"?>
 <p:sld xmlns:a="http://schemas.openxmlformats.org/drawingml/2006/main" xmlns:r="http://schemas.openxmlformats.org/officeDocument/2006/relationships" xmlns:p="http://schemas.openxmlformats.org/presentationml/2006/main">
   <p:cSld>
     <p:spTree>
@@ -12947,7 +13275,7 @@
 </p:sld>
 </file>
 
-<file path=ppt/slides/slide6.xml><?xml version="1.0" encoding="utf-8"?>
+<file path=ppt/slides/slide7.xml><?xml version="1.0" encoding="utf-8"?>
 <p:sld xmlns:a="http://schemas.openxmlformats.org/drawingml/2006/main" xmlns:r="http://schemas.openxmlformats.org/officeDocument/2006/relationships" xmlns:p="http://schemas.openxmlformats.org/presentationml/2006/main">
   <p:cSld>
     <p:spTree>
@@ -13063,7 +13391,7 @@
 </p:sld>
 </file>
 
-<file path=ppt/slides/slide7.xml><?xml version="1.0" encoding="utf-8"?>
+<file path=ppt/slides/slide8.xml><?xml version="1.0" encoding="utf-8"?>
 <p:sld xmlns:a="http://schemas.openxmlformats.org/drawingml/2006/main" xmlns:r="http://schemas.openxmlformats.org/officeDocument/2006/relationships" xmlns:p="http://schemas.openxmlformats.org/presentationml/2006/main">
   <p:cSld>
     <p:spTree>
@@ -13123,7 +13451,7 @@
 </p:sld>
 </file>
 
-<file path=ppt/slides/slide8.xml><?xml version="1.0" encoding="utf-8"?>
+<file path=ppt/slides/slide9.xml><?xml version="1.0" encoding="utf-8"?>
 <p:sld xmlns:a="http://schemas.openxmlformats.org/drawingml/2006/main" xmlns:r="http://schemas.openxmlformats.org/officeDocument/2006/relationships" xmlns:p="http://schemas.openxmlformats.org/presentationml/2006/main">
   <p:cSld>
     <p:spTree>
@@ -13191,121 +13519,6 @@
     <p:extLst>
       <p:ext uri="{BB962C8B-B14F-4D97-AF65-F5344CB8AC3E}">
         <p14:creationId xmlns:p14="http://schemas.microsoft.com/office/powerpoint/2010/main" val="2029549567"/>
-      </p:ext>
-    </p:extLst>
-  </p:cSld>
-  <p:clrMapOvr>
-    <a:masterClrMapping/>
-  </p:clrMapOvr>
-</p:sld>
-</file>
-
-<file path=ppt/slides/slide9.xml><?xml version="1.0" encoding="utf-8"?>
-<p:sld xmlns:a="http://schemas.openxmlformats.org/drawingml/2006/main" xmlns:r="http://schemas.openxmlformats.org/officeDocument/2006/relationships" xmlns:p="http://schemas.openxmlformats.org/presentationml/2006/main">
-  <p:cSld>
-    <p:spTree>
-      <p:nvGrpSpPr>
-        <p:cNvPr id="1" name=""/>
-        <p:cNvGrpSpPr/>
-        <p:nvPr/>
-      </p:nvGrpSpPr>
-      <p:grpSpPr>
-        <a:xfrm>
-          <a:off x="0" y="0"/>
-          <a:ext cx="0" cy="0"/>
-          <a:chOff x="0" y="0"/>
-          <a:chExt cx="0" cy="0"/>
-        </a:xfrm>
-      </p:grpSpPr>
-      <p:sp>
-        <p:nvSpPr>
-          <p:cNvPr id="7170" name="Rectangle 2"/>
-          <p:cNvSpPr>
-            <a:spLocks noGrp="1" noChangeArrowheads="1"/>
-          </p:cNvSpPr>
-          <p:nvPr>
-            <p:ph type="title"/>
-          </p:nvPr>
-        </p:nvSpPr>
-        <p:spPr/>
-        <p:txBody>
-          <a:bodyPr/>
-          <a:lstStyle/>
-          <a:p>
-            <a:r>
-              <a:rPr lang="en-US" altLang="en-US" dirty="0"/>
-              <a:t> Tools</a:t>
-            </a:r>
-          </a:p>
-        </p:txBody>
-      </p:sp>
-      <p:sp>
-        <p:nvSpPr>
-          <p:cNvPr id="7171" name="Rectangle 3"/>
-          <p:cNvSpPr>
-            <a:spLocks noGrp="1" noChangeArrowheads="1"/>
-          </p:cNvSpPr>
-          <p:nvPr>
-            <p:ph type="body" idx="1"/>
-          </p:nvPr>
-        </p:nvSpPr>
-        <p:spPr/>
-        <p:txBody>
-          <a:bodyPr>
-            <a:normAutofit/>
-          </a:bodyPr>
-          <a:lstStyle/>
-          <a:p>
-            <a:r>
-              <a:rPr lang="en-US" dirty="0"/>
-              <a:t>SQL (directly and through python – psycopg2)</a:t>
-            </a:r>
-            <a:br>
-              <a:rPr lang="en-US" dirty="0"/>
-            </a:br>
-            <a:endParaRPr lang="en-US" dirty="0"/>
-          </a:p>
-          <a:p>
-            <a:r>
-              <a:rPr lang="en-US" dirty="0"/>
-              <a:t>Python (matplotlib, seaborn, </a:t>
-            </a:r>
-            <a:r>
-              <a:rPr lang="en-US" dirty="0" err="1"/>
-              <a:t>altair</a:t>
-            </a:r>
-            <a:r>
-              <a:rPr lang="en-US" dirty="0"/>
-              <a:t>,...)</a:t>
-            </a:r>
-            <a:br>
-              <a:rPr lang="en-US" dirty="0"/>
-            </a:br>
-            <a:endParaRPr lang="en-US" dirty="0"/>
-          </a:p>
-          <a:p>
-            <a:r>
-              <a:rPr lang="en-US" dirty="0"/>
-              <a:t>Pandas(if you have to)</a:t>
-            </a:r>
-            <a:br>
-              <a:rPr lang="en-US" dirty="0"/>
-            </a:br>
-            <a:endParaRPr lang="en-US" dirty="0"/>
-          </a:p>
-          <a:p>
-            <a:r>
-              <a:rPr lang="en-US" dirty="0"/>
-              <a:t>Tableau </a:t>
-            </a:r>
-            <a:endParaRPr lang="en-US" sz="2800" dirty="0"/>
-          </a:p>
-        </p:txBody>
-      </p:sp>
-    </p:spTree>
-    <p:extLst>
-      <p:ext uri="{BB962C8B-B14F-4D97-AF65-F5344CB8AC3E}">
-        <p14:creationId xmlns:p14="http://schemas.microsoft.com/office/powerpoint/2010/main" val="3416135692"/>
       </p:ext>
     </p:extLst>
   </p:cSld>

</xml_diff>